<commit_message>
fixed minor typo in slides
</commit_message>
<xml_diff>
--- a/slides/graphs-topoSort-connComponents.pptx
+++ b/slides/graphs-topoSort-connComponents.pptx
@@ -7825,7 +7825,15 @@
             <a:pPr lvl="1"/>
             <a:r>
               <a:rPr lang="en-US" dirty="0"/>
-              <a:t>Reversed edges in GT stop it visiting nodes in SCCs yet to be found</a:t>
+              <a:t>Reversed edges in G</a:t>
+            </a:r>
+            <a:r>
+              <a:rPr lang="en-US" baseline="30000" dirty="0"/>
+              <a:t>T</a:t>
+            </a:r>
+            <a:r>
+              <a:rPr lang="en-US" dirty="0"/>
+              <a:t> stop it visiting nodes in SCCs yet to be found</a:t>
             </a:r>
           </a:p>
           <a:p>

</xml_diff>

<commit_message>
updates to first set of Greedy slides
</commit_message>
<xml_diff>
--- a/slides/graphs-topoSort-connComponents.pptx
+++ b/slides/graphs-topoSort-connComponents.pptx
@@ -227,7 +227,7 @@
           <a:p>
             <a:fld id="{9A9F7FD5-2840-4607-A4CD-0A8A66D9D61D}" type="datetimeFigureOut">
               <a:rPr lang="en-US" smtClean="0"/>
-              <a:t>3/5/21</a:t>
+              <a:t>10/18/21</a:t>
             </a:fld>
             <a:endParaRPr lang="en-US"/>
           </a:p>
@@ -752,7 +752,7 @@
           <a:p>
             <a:fld id="{088A2421-D2CD-4522-A1BA-E4F59ED821B7}" type="datetime1">
               <a:rPr lang="en-US" smtClean="0"/>
-              <a:t>3/5/21</a:t>
+              <a:t>10/18/21</a:t>
             </a:fld>
             <a:endParaRPr lang="en-US"/>
           </a:p>
@@ -1027,7 +1027,7 @@
           <a:p>
             <a:fld id="{DA91928D-0C55-4D8D-9D16-4C05754E5356}" type="datetime1">
               <a:rPr lang="en-US" smtClean="0"/>
-              <a:t>3/5/21</a:t>
+              <a:t>10/18/21</a:t>
             </a:fld>
             <a:endParaRPr lang="en-US"/>
           </a:p>
@@ -1282,7 +1282,7 @@
           <a:p>
             <a:fld id="{584CEDDD-253B-4C38-A621-35D8BA950C17}" type="datetime1">
               <a:rPr lang="en-US" smtClean="0"/>
-              <a:t>3/5/21</a:t>
+              <a:t>10/18/21</a:t>
             </a:fld>
             <a:endParaRPr lang="en-US"/>
           </a:p>
@@ -1450,7 +1450,7 @@
           <a:p>
             <a:fld id="{BF0967E4-28CB-45C9-B82C-D6B22AD4F0EB}" type="datetime1">
               <a:rPr lang="en-US" smtClean="0"/>
-              <a:t>3/5/21</a:t>
+              <a:t>10/18/21</a:t>
             </a:fld>
             <a:endParaRPr lang="en-US"/>
           </a:p>
@@ -1628,7 +1628,7 @@
           <a:p>
             <a:fld id="{2454C693-B405-44E1-A127-B7CE8B45C1E1}" type="datetime1">
               <a:rPr lang="en-US" smtClean="0"/>
-              <a:t>3/5/21</a:t>
+              <a:t>10/18/21</a:t>
             </a:fld>
             <a:endParaRPr lang="en-US"/>
           </a:p>
@@ -1880,7 +1880,7 @@
           <a:p>
             <a:fld id="{26B28102-2E91-4DD7-8E8B-98B790A12701}" type="datetime1">
               <a:rPr lang="en-US" smtClean="0"/>
-              <a:t>3/5/21</a:t>
+              <a:t>10/18/21</a:t>
             </a:fld>
             <a:endParaRPr lang="en-US"/>
           </a:p>
@@ -2138,7 +2138,7 @@
           <a:p>
             <a:fld id="{0B5AF985-6D44-417A-9881-D208468CBA07}" type="datetime1">
               <a:rPr lang="en-US" smtClean="0"/>
-              <a:t>3/5/21</a:t>
+              <a:t>10/18/21</a:t>
             </a:fld>
             <a:endParaRPr lang="en-US"/>
           </a:p>
@@ -2395,7 +2395,7 @@
           <a:p>
             <a:fld id="{26B28102-2E91-4DD7-8E8B-98B790A12701}" type="datetime1">
               <a:rPr lang="en-US" smtClean="0"/>
-              <a:t>3/5/21</a:t>
+              <a:t>10/18/21</a:t>
             </a:fld>
             <a:endParaRPr lang="en-US"/>
           </a:p>
@@ -2641,7 +2641,7 @@
           <a:p>
             <a:fld id="{3A604A86-E8D2-4E57-8D6D-61E2D175474B}" type="datetime1">
               <a:rPr lang="en-US" smtClean="0"/>
-              <a:t>3/5/21</a:t>
+              <a:t>10/18/21</a:t>
             </a:fld>
             <a:endParaRPr lang="en-US"/>
           </a:p>
@@ -3004,7 +3004,7 @@
           <a:p>
             <a:fld id="{DC921DF3-1FB0-45DC-97EF-461960E13574}" type="datetime1">
               <a:rPr lang="en-US" smtClean="0"/>
-              <a:t>3/5/21</a:t>
+              <a:t>10/18/21</a:t>
             </a:fld>
             <a:endParaRPr lang="en-US"/>
           </a:p>
@@ -3496,7 +3496,7 @@
           <a:p>
             <a:fld id="{092B088E-2809-46D8-B43F-738015D878CC}" type="datetime1">
               <a:rPr lang="en-US" smtClean="0"/>
-              <a:t>3/5/21</a:t>
+              <a:t>10/18/21</a:t>
             </a:fld>
             <a:endParaRPr lang="en-US"/>
           </a:p>
@@ -3691,7 +3691,7 @@
           <a:p>
             <a:fld id="{8208D42A-BC08-426E-9E11-483BA9D61AF6}" type="datetime1">
               <a:rPr lang="en-US" smtClean="0"/>
-              <a:t>3/5/21</a:t>
+              <a:t>10/18/21</a:t>
             </a:fld>
             <a:endParaRPr lang="en-US"/>
           </a:p>
@@ -3891,7 +3891,7 @@
           <a:p>
             <a:fld id="{26B28102-2E91-4DD7-8E8B-98B790A12701}" type="datetime1">
               <a:rPr lang="en-US" smtClean="0"/>
-              <a:t>3/5/21</a:t>
+              <a:t>10/18/21</a:t>
             </a:fld>
             <a:endParaRPr lang="en-US"/>
           </a:p>
@@ -3987,7 +3987,7 @@
           <a:p>
             <a:fld id="{37D5C786-44E1-4BD5-AD14-75F3EA166B5A}" type="datetime1">
               <a:rPr lang="en-US" smtClean="0"/>
-              <a:t>3/5/21</a:t>
+              <a:t>10/18/21</a:t>
             </a:fld>
             <a:endParaRPr lang="en-US"/>
           </a:p>
@@ -4198,7 +4198,7 @@
           <a:p>
             <a:fld id="{26B28102-2E91-4DD7-8E8B-98B790A12701}" type="datetime1">
               <a:rPr lang="en-US" smtClean="0"/>
-              <a:t>3/5/21</a:t>
+              <a:t>10/18/21</a:t>
             </a:fld>
             <a:endParaRPr lang="en-US"/>
           </a:p>
@@ -11467,7 +11467,7 @@
         <p:spPr bwMode="auto">
           <a:xfrm>
             <a:off x="2362201" y="2438400"/>
-            <a:ext cx="5535811" cy="3785652"/>
+            <a:ext cx="6431889" cy="3785652"/>
           </a:xfrm>
           <a:prstGeom prst="rect">
             <a:avLst/>
@@ -11478,14 +11478,14 @@
           </a:ln>
           <a:extLst>
             <a:ext uri="{909E8E84-426E-40dd-AFC4-6F175D3DCCD1}">
-              <a14:hiddenFill xmlns:a14="http://schemas.microsoft.com/office/drawing/2010/main" xmlns="">
+              <a14:hiddenFill xmlns="" xmlns:a14="http://schemas.microsoft.com/office/drawing/2010/main">
                 <a:solidFill>
                   <a:srgbClr val="FFFFFF"/>
                 </a:solidFill>
               </a14:hiddenFill>
             </a:ext>
             <a:ext uri="{91240B29-F687-4f45-9708-019B960494DF}">
-              <a14:hiddenLine xmlns:a14="http://schemas.microsoft.com/office/drawing/2010/main" xmlns="" w="9525">
+              <a14:hiddenLine xmlns="" xmlns:a14="http://schemas.microsoft.com/office/drawing/2010/main" w="9525">
                 <a:solidFill>
                   <a:srgbClr val="000000"/>
                 </a:solidFill>
@@ -11609,7 +11609,7 @@
           </a:lstStyle>
           <a:p>
             <a:r>
-              <a:rPr lang="en-US" altLang="en-US">
+              <a:rPr lang="en-US" altLang="en-US" dirty="0">
                 <a:latin typeface="Calibri" panose="020F0502020204030204" pitchFamily="34" charset="0"/>
               </a:rPr>
               <a:t>DFS(G)</a:t>
@@ -11617,21 +11617,39 @@
           </a:p>
           <a:p>
             <a:r>
-              <a:rPr lang="en-US" altLang="en-US">
+              <a:rPr lang="en-US" altLang="en-US" dirty="0">
                 <a:solidFill>
                   <a:srgbClr val="FF0000"/>
                 </a:solidFill>
                 <a:latin typeface="Calibri" panose="020F0502020204030204" pitchFamily="34" charset="0"/>
               </a:rPr>
-              <a:t>0 toposort-list = [ ] // empty list</a:t>
-            </a:r>
-            <a:endParaRPr lang="en-US" altLang="en-US">
+              <a:t>0 </a:t>
+            </a:r>
+            <a:r>
+              <a:rPr lang="en-US" altLang="en-US" dirty="0" err="1">
+                <a:solidFill>
+                  <a:srgbClr val="FF0000"/>
+                </a:solidFill>
+                <a:latin typeface="Calibri" panose="020F0502020204030204" pitchFamily="34" charset="0"/>
+              </a:rPr>
+              <a:t>toposort</a:t>
+            </a:r>
+            <a:r>
+              <a:rPr lang="en-US" altLang="en-US" dirty="0">
+                <a:solidFill>
+                  <a:srgbClr val="FF0000"/>
+                </a:solidFill>
+                <a:latin typeface="Calibri" panose="020F0502020204030204" pitchFamily="34" charset="0"/>
+              </a:rPr>
+              <a:t>-list = [ ] // empty list</a:t>
+            </a:r>
+            <a:endParaRPr lang="en-US" altLang="en-US" dirty="0">
               <a:latin typeface="Calibri" panose="020F0502020204030204" pitchFamily="34" charset="0"/>
             </a:endParaRPr>
           </a:p>
           <a:p>
             <a:r>
-              <a:rPr lang="en-US" altLang="en-US">
+              <a:rPr lang="en-US" altLang="en-US" dirty="0">
                 <a:latin typeface="Calibri" panose="020F0502020204030204" pitchFamily="34" charset="0"/>
               </a:rPr>
               <a:t>1 for each vertex u in G.V</a:t>
@@ -11639,27 +11657,39 @@
           </a:p>
           <a:p>
             <a:r>
-              <a:rPr lang="en-US" altLang="en-US">
+              <a:rPr lang="en-US" altLang="en-US" dirty="0">
                 <a:latin typeface="Calibri" panose="020F0502020204030204" pitchFamily="34" charset="0"/>
               </a:rPr>
-              <a:t>2       u.color = WHITE</a:t>
-            </a:r>
-          </a:p>
-          <a:p>
-            <a:r>
-              <a:rPr lang="en-US" altLang="en-US">
+              <a:t>2       </a:t>
+            </a:r>
+            <a:r>
+              <a:rPr lang="en-US" altLang="en-US" dirty="0" err="1">
+                <a:latin typeface="Calibri" panose="020F0502020204030204" pitchFamily="34" charset="0"/>
+              </a:rPr>
+              <a:t>u.color</a:t>
+            </a:r>
+            <a:r>
+              <a:rPr lang="en-US" altLang="en-US" dirty="0">
+                <a:latin typeface="Calibri" panose="020F0502020204030204" pitchFamily="34" charset="0"/>
+              </a:rPr>
+              <a:t> = WHITE</a:t>
+            </a:r>
+          </a:p>
+          <a:p>
+            <a:r>
+              <a:rPr lang="en-US" altLang="en-US" dirty="0">
                 <a:latin typeface="Calibri" panose="020F0502020204030204" pitchFamily="34" charset="0"/>
               </a:rPr>
               <a:t>3       u.</a:t>
             </a:r>
             <a:r>
-              <a:rPr lang="el-GR" altLang="en-US">
+              <a:rPr lang="el-GR" altLang="en-US" dirty="0">
                 <a:latin typeface="Calibri" panose="020F0502020204030204" pitchFamily="34" charset="0"/>
               </a:rPr>
               <a:t>π</a:t>
             </a:r>
             <a:r>
-              <a:rPr lang="en-US" altLang="en-US">
+              <a:rPr lang="en-US" altLang="en-US" dirty="0">
                 <a:latin typeface="Calibri" panose="020F0502020204030204" pitchFamily="34" charset="0"/>
               </a:rPr>
               <a:t> = NIL</a:t>
@@ -11667,7 +11697,7 @@
           </a:p>
           <a:p>
             <a:r>
-              <a:rPr lang="en-US" altLang="en-US">
+              <a:rPr lang="en-US" altLang="en-US" dirty="0">
                 <a:latin typeface="Calibri" panose="020F0502020204030204" pitchFamily="34" charset="0"/>
               </a:rPr>
               <a:t>4 time = 0</a:t>
@@ -11675,7 +11705,7 @@
           </a:p>
           <a:p>
             <a:r>
-              <a:rPr lang="en-US" altLang="en-US">
+              <a:rPr lang="en-US" altLang="en-US" dirty="0">
                 <a:latin typeface="Calibri" panose="020F0502020204030204" pitchFamily="34" charset="0"/>
               </a:rPr>
               <a:t>5 for each vertex u in G.V</a:t>
@@ -11683,10 +11713,22 @@
           </a:p>
           <a:p>
             <a:r>
-              <a:rPr lang="en-US" altLang="en-US">
+              <a:rPr lang="en-US" altLang="en-US" dirty="0">
                 <a:latin typeface="Calibri" panose="020F0502020204030204" pitchFamily="34" charset="0"/>
               </a:rPr>
-              <a:t>6       if u.color == WHITE  // if unseen</a:t>
+              <a:t>6       if </a:t>
+            </a:r>
+            <a:r>
+              <a:rPr lang="en-US" altLang="en-US" dirty="0" err="1">
+                <a:latin typeface="Calibri" panose="020F0502020204030204" pitchFamily="34" charset="0"/>
+              </a:rPr>
+              <a:t>u.color</a:t>
+            </a:r>
+            <a:r>
+              <a:rPr lang="en-US" altLang="en-US" dirty="0">
+                <a:latin typeface="Calibri" panose="020F0502020204030204" pitchFamily="34" charset="0"/>
+              </a:rPr>
+              <a:t> == WHITE  // if unseen</a:t>
             </a:r>
           </a:p>
           <a:p>
@@ -11698,18 +11740,36 @@
               <a:rPr lang="en-US" altLang="en-US">
                 <a:latin typeface="Calibri" panose="020F0502020204030204" pitchFamily="34" charset="0"/>
               </a:rPr>
-              <a:t>  DFS-VISIT(G, u)  // explore paths out of u</a:t>
-            </a:r>
-          </a:p>
-          <a:p>
-            <a:r>
-              <a:rPr lang="en-US" altLang="en-US">
+              <a:t>               DFS-VISIT(G, u)  // explore paths out of u</a:t>
+            </a:r>
+          </a:p>
+          <a:p>
+            <a:r>
+              <a:rPr lang="en-US" altLang="en-US" dirty="0">
                 <a:solidFill>
                   <a:srgbClr val="FF0000"/>
                 </a:solidFill>
                 <a:latin typeface="Calibri" panose="020F0502020204030204" pitchFamily="34" charset="0"/>
               </a:rPr>
-              <a:t>8 // toposort-list contains the result</a:t>
+              <a:t>8 // </a:t>
+            </a:r>
+            <a:r>
+              <a:rPr lang="en-US" altLang="en-US" dirty="0" err="1">
+                <a:solidFill>
+                  <a:srgbClr val="FF0000"/>
+                </a:solidFill>
+                <a:latin typeface="Calibri" panose="020F0502020204030204" pitchFamily="34" charset="0"/>
+              </a:rPr>
+              <a:t>toposort</a:t>
+            </a:r>
+            <a:r>
+              <a:rPr lang="en-US" altLang="en-US" dirty="0">
+                <a:solidFill>
+                  <a:srgbClr val="FF0000"/>
+                </a:solidFill>
+                <a:latin typeface="Calibri" panose="020F0502020204030204" pitchFamily="34" charset="0"/>
+              </a:rPr>
+              <a:t>-list contains the result</a:t>
             </a:r>
           </a:p>
         </p:txBody>

</xml_diff>